<commit_message>
Passed version of terasolunaorg-guideline-107946410
</commit_message>
<xml_diff>
--- a/source/Overview/images_FrameworkStack/materialFrameworkStack.pptx
+++ b/source/Overview/images_FrameworkStack/materialFrameworkStack.pptx
@@ -121,6 +121,20 @@
         </p14:section>
       </p14:sectionLst>
     </p:ext>
+    <p:ext uri="{EFAFB233-063F-42B5-8137-9DF3F51BA10A}">
+      <p15:sldGuideLst xmlns:p15="http://schemas.microsoft.com/office/powerpoint/2012/main">
+        <p15:guide id="1" orient="horz" pos="2160">
+          <p15:clr>
+            <a:srgbClr val="A4A3A4"/>
+          </p15:clr>
+        </p15:guide>
+        <p15:guide id="2" pos="2880">
+          <p15:clr>
+            <a:srgbClr val="A4A3A4"/>
+          </p15:clr>
+        </p15:guide>
+      </p15:sldGuideLst>
+    </p:ext>
   </p:extLst>
 </p:presentation>
 </file>
@@ -207,7 +221,7 @@
           <a:p>
             <a:fld id="{3BB47352-BF5A-4CD2-B029-996118CD8E01}" type="datetimeFigureOut">
               <a:rPr kumimoji="1" lang="ja-JP" altLang="en-US" smtClean="0"/>
-              <a:t>15/06/13</a:t>
+              <a:t>2016/2/5</a:t>
             </a:fld>
             <a:endParaRPr kumimoji="1" lang="ja-JP" altLang="en-US"/>
           </a:p>
@@ -940,7 +954,7 @@
           <a:p>
             <a:fld id="{7B9B12EC-6AA0-374B-A2D3-850081A07A26}" type="datetimeFigureOut">
               <a:rPr kumimoji="1" lang="ja-JP" altLang="en-US" smtClean="0"/>
-              <a:t>15/06/13</a:t>
+              <a:t>2016/2/5</a:t>
             </a:fld>
             <a:endParaRPr kumimoji="1" lang="ja-JP" altLang="en-US"/>
           </a:p>
@@ -1142,7 +1156,7 @@
           <a:p>
             <a:fld id="{7B9B12EC-6AA0-374B-A2D3-850081A07A26}" type="datetimeFigureOut">
               <a:rPr kumimoji="1" lang="ja-JP" altLang="en-US" smtClean="0"/>
-              <a:t>15/06/13</a:t>
+              <a:t>2016/2/5</a:t>
             </a:fld>
             <a:endParaRPr kumimoji="1" lang="ja-JP" altLang="en-US"/>
           </a:p>
@@ -1354,7 +1368,7 @@
           <a:p>
             <a:fld id="{7B9B12EC-6AA0-374B-A2D3-850081A07A26}" type="datetimeFigureOut">
               <a:rPr kumimoji="1" lang="ja-JP" altLang="en-US" smtClean="0"/>
-              <a:t>15/06/13</a:t>
+              <a:t>2016/2/5</a:t>
             </a:fld>
             <a:endParaRPr kumimoji="1" lang="ja-JP" altLang="en-US"/>
           </a:p>
@@ -1556,7 +1570,7 @@
           <a:p>
             <a:fld id="{7B9B12EC-6AA0-374B-A2D3-850081A07A26}" type="datetimeFigureOut">
               <a:rPr kumimoji="1" lang="ja-JP" altLang="en-US" smtClean="0"/>
-              <a:t>15/06/13</a:t>
+              <a:t>2016/2/5</a:t>
             </a:fld>
             <a:endParaRPr kumimoji="1" lang="ja-JP" altLang="en-US"/>
           </a:p>
@@ -1802,7 +1816,7 @@
           <a:p>
             <a:fld id="{7B9B12EC-6AA0-374B-A2D3-850081A07A26}" type="datetimeFigureOut">
               <a:rPr kumimoji="1" lang="ja-JP" altLang="en-US" smtClean="0"/>
-              <a:t>15/06/13</a:t>
+              <a:t>2016/2/5</a:t>
             </a:fld>
             <a:endParaRPr kumimoji="1" lang="ja-JP" altLang="en-US"/>
           </a:p>
@@ -2154,7 +2168,7 @@
           <a:p>
             <a:fld id="{7B9B12EC-6AA0-374B-A2D3-850081A07A26}" type="datetimeFigureOut">
               <a:rPr kumimoji="1" lang="ja-JP" altLang="en-US" smtClean="0"/>
-              <a:t>15/06/13</a:t>
+              <a:t>2016/2/5</a:t>
             </a:fld>
             <a:endParaRPr kumimoji="1" lang="ja-JP" altLang="en-US"/>
           </a:p>
@@ -2640,7 +2654,7 @@
           <a:p>
             <a:fld id="{7B9B12EC-6AA0-374B-A2D3-850081A07A26}" type="datetimeFigureOut">
               <a:rPr kumimoji="1" lang="ja-JP" altLang="en-US" smtClean="0"/>
-              <a:t>15/06/13</a:t>
+              <a:t>2016/2/5</a:t>
             </a:fld>
             <a:endParaRPr kumimoji="1" lang="ja-JP" altLang="en-US"/>
           </a:p>
@@ -2758,7 +2772,7 @@
           <a:p>
             <a:fld id="{7B9B12EC-6AA0-374B-A2D3-850081A07A26}" type="datetimeFigureOut">
               <a:rPr kumimoji="1" lang="ja-JP" altLang="en-US" smtClean="0"/>
-              <a:t>15/06/13</a:t>
+              <a:t>2016/2/5</a:t>
             </a:fld>
             <a:endParaRPr kumimoji="1" lang="ja-JP" altLang="en-US"/>
           </a:p>
@@ -2853,7 +2867,7 @@
           <a:p>
             <a:fld id="{7B9B12EC-6AA0-374B-A2D3-850081A07A26}" type="datetimeFigureOut">
               <a:rPr kumimoji="1" lang="ja-JP" altLang="en-US" smtClean="0"/>
-              <a:t>15/06/13</a:t>
+              <a:t>2016/2/5</a:t>
             </a:fld>
             <a:endParaRPr kumimoji="1" lang="ja-JP" altLang="en-US"/>
           </a:p>
@@ -3162,7 +3176,7 @@
           <a:p>
             <a:fld id="{7B9B12EC-6AA0-374B-A2D3-850081A07A26}" type="datetimeFigureOut">
               <a:rPr kumimoji="1" lang="ja-JP" altLang="en-US" smtClean="0"/>
-              <a:t>15/06/13</a:t>
+              <a:t>2016/2/5</a:t>
             </a:fld>
             <a:endParaRPr kumimoji="1" lang="ja-JP" altLang="en-US"/>
           </a:p>
@@ -3415,7 +3429,7 @@
           <a:p>
             <a:fld id="{7B9B12EC-6AA0-374B-A2D3-850081A07A26}" type="datetimeFigureOut">
               <a:rPr kumimoji="1" lang="ja-JP" altLang="en-US" smtClean="0"/>
-              <a:t>15/06/13</a:t>
+              <a:t>2016/2/5</a:t>
             </a:fld>
             <a:endParaRPr kumimoji="1" lang="ja-JP" altLang="en-US"/>
           </a:p>
@@ -3660,7 +3674,7 @@
           <a:p>
             <a:fld id="{7B9B12EC-6AA0-374B-A2D3-850081A07A26}" type="datetimeFigureOut">
               <a:rPr kumimoji="1" lang="ja-JP" altLang="en-US" smtClean="0"/>
-              <a:t>15/06/13</a:t>
+              <a:t>2016/2/5</a:t>
             </a:fld>
             <a:endParaRPr kumimoji="1" lang="ja-JP" altLang="en-US"/>
           </a:p>
@@ -4920,7 +4934,7 @@
   <p:timing>
     <p:tnLst>
       <p:par>
-        <p:cTn xmlns:p14="http://schemas.microsoft.com/office/powerpoint/2010/main" id="1" dur="indefinite" restart="never" nodeType="tmRoot"/>
+        <p:cTn id="1" dur="indefinite" restart="never" nodeType="tmRoot"/>
       </p:par>
     </p:tnLst>
   </p:timing>
@@ -6723,7 +6737,7 @@
   <p:timing>
     <p:tnLst>
       <p:par>
-        <p:cTn xmlns:p14="http://schemas.microsoft.com/office/powerpoint/2010/main" id="1" dur="indefinite" restart="never" nodeType="tmRoot"/>
+        <p:cTn id="1" dur="indefinite" restart="never" nodeType="tmRoot"/>
       </p:par>
     </p:tnLst>
   </p:timing>
@@ -6755,7 +6769,7 @@
         </p:nvSpPr>
         <p:spPr>
           <a:xfrm>
-            <a:off x="3041856" y="3223242"/>
+            <a:off x="3114778" y="4425030"/>
             <a:ext cx="3387338" cy="368242"/>
           </a:xfrm>
           <a:prstGeom prst="roundRect">
@@ -6836,7 +6850,7 @@
         </p:nvSpPr>
         <p:spPr>
           <a:xfrm>
-            <a:off x="3045425" y="2552176"/>
+            <a:off x="3118347" y="3778545"/>
             <a:ext cx="3363924" cy="368242"/>
           </a:xfrm>
           <a:prstGeom prst="roundRect">
@@ -6917,7 +6931,7 @@
         </p:nvSpPr>
         <p:spPr>
           <a:xfrm>
-            <a:off x="3075191" y="5106646"/>
+            <a:off x="3148113" y="6364485"/>
             <a:ext cx="3363925" cy="368242"/>
           </a:xfrm>
           <a:prstGeom prst="roundRect">
@@ -6998,7 +7012,7 @@
         </p:nvSpPr>
         <p:spPr>
           <a:xfrm>
-            <a:off x="3085362" y="5746340"/>
+            <a:off x="3158284" y="7010967"/>
             <a:ext cx="3353754" cy="368242"/>
           </a:xfrm>
           <a:prstGeom prst="roundRect">
@@ -7047,29 +7061,7 @@
                   </a:schemeClr>
                 </a:solidFill>
               </a:rPr>
-              <a:t>recommended-</a:t>
-            </a:r>
-            <a:r>
-              <a:rPr lang="en-US" altLang="ja-JP" sz="1600" dirty="0" smtClean="0">
-                <a:solidFill>
-                  <a:schemeClr val="tx1">
-                    <a:lumMod val="75000"/>
-                    <a:lumOff val="25000"/>
-                  </a:schemeClr>
-                </a:solidFill>
-              </a:rPr>
-              <a:t>web-</a:t>
-            </a:r>
-            <a:r>
-              <a:rPr lang="en-US" altLang="ja-JP" sz="1600" dirty="0" smtClean="0">
-                <a:solidFill>
-                  <a:schemeClr val="tx1">
-                    <a:lumMod val="75000"/>
-                    <a:lumOff val="25000"/>
-                  </a:schemeClr>
-                </a:solidFill>
-              </a:rPr>
-              <a:t>dependencies</a:t>
+              <a:t>recommended-web-dependencies</a:t>
             </a:r>
             <a:endParaRPr kumimoji="1" lang="en-US" altLang="ja-JP" sz="1600" dirty="0" smtClean="0">
               <a:solidFill>
@@ -7090,7 +7082,7 @@
         </p:nvSpPr>
         <p:spPr>
           <a:xfrm>
-            <a:off x="3051778" y="3867662"/>
+            <a:off x="3124700" y="5071515"/>
             <a:ext cx="3387338" cy="368242"/>
           </a:xfrm>
           <a:prstGeom prst="roundRect">
@@ -7160,7 +7152,7 @@
         </p:nvSpPr>
         <p:spPr>
           <a:xfrm>
-            <a:off x="3065269" y="4496278"/>
+            <a:off x="3138191" y="5718000"/>
             <a:ext cx="3387338" cy="368242"/>
           </a:xfrm>
           <a:prstGeom prst="roundRect">
@@ -7230,7 +7222,7 @@
         </p:nvSpPr>
         <p:spPr>
           <a:xfrm>
-            <a:off x="3031933" y="1174458"/>
+            <a:off x="3104855" y="1839090"/>
             <a:ext cx="3387338" cy="368242"/>
           </a:xfrm>
           <a:prstGeom prst="roundRect">
@@ -7300,7 +7292,7 @@
         </p:nvSpPr>
         <p:spPr>
           <a:xfrm>
-            <a:off x="3041856" y="1854640"/>
+            <a:off x="3114778" y="2485575"/>
             <a:ext cx="3377415" cy="368242"/>
           </a:xfrm>
           <a:prstGeom prst="roundRect">
@@ -7351,14 +7343,6 @@
               </a:rPr>
               <a:t>web</a:t>
             </a:r>
-            <a:endParaRPr kumimoji="1" lang="en-US" altLang="ja-JP" sz="1600" dirty="0" smtClean="0">
-              <a:solidFill>
-                <a:schemeClr val="tx1">
-                  <a:lumMod val="75000"/>
-                  <a:lumOff val="25000"/>
-                </a:schemeClr>
-              </a:solidFill>
-            </a:endParaRPr>
           </a:p>
         </p:txBody>
       </p:sp>
@@ -7370,7 +7354,7 @@
         </p:nvSpPr>
         <p:spPr>
           <a:xfrm>
-            <a:off x="3031934" y="494593"/>
+            <a:off x="3104856" y="1192605"/>
             <a:ext cx="3387338" cy="368242"/>
           </a:xfrm>
           <a:prstGeom prst="roundRect">
@@ -7440,7 +7424,7 @@
         </p:nvSpPr>
         <p:spPr>
           <a:xfrm>
-            <a:off x="445972" y="3225372"/>
+            <a:off x="234882" y="2539300"/>
             <a:ext cx="1339676" cy="368242"/>
           </a:xfrm>
           <a:prstGeom prst="roundRect">
@@ -7491,14 +7475,6 @@
               </a:rPr>
               <a:t>parent</a:t>
             </a:r>
-            <a:endParaRPr kumimoji="1" lang="en-US" altLang="ja-JP" sz="1600" dirty="0" smtClean="0">
-              <a:solidFill>
-                <a:schemeClr val="tx1">
-                  <a:lumMod val="75000"/>
-                  <a:lumOff val="25000"/>
-                </a:schemeClr>
-              </a:solidFill>
-            </a:endParaRPr>
           </a:p>
         </p:txBody>
       </p:sp>
@@ -7513,8 +7489,8 @@
         </p:nvCxnSpPr>
         <p:spPr>
           <a:xfrm>
-            <a:off x="4727387" y="2920418"/>
-            <a:ext cx="8138" cy="302824"/>
+            <a:off x="4800309" y="4146787"/>
+            <a:ext cx="8138" cy="278243"/>
           </a:xfrm>
           <a:prstGeom prst="straightConnector1">
             <a:avLst/>
@@ -7550,15 +7526,15 @@
         <p:nvCxnSpPr>
           <p:cNvPr id="57" name="直線コネクタ 2"/>
           <p:cNvCxnSpPr>
-            <a:stCxn id="47" idx="0"/>
+            <a:stCxn id="60" idx="0"/>
             <a:endCxn id="53" idx="2"/>
           </p:cNvCxnSpPr>
           <p:nvPr/>
         </p:nvCxnSpPr>
         <p:spPr>
           <a:xfrm flipV="1">
-            <a:off x="4727387" y="2222882"/>
-            <a:ext cx="3177" cy="329294"/>
+            <a:off x="4803486" y="2853817"/>
+            <a:ext cx="0" cy="278243"/>
           </a:xfrm>
           <a:prstGeom prst="straightConnector1">
             <a:avLst/>
@@ -7601,8 +7577,8 @@
         </p:nvCxnSpPr>
         <p:spPr>
           <a:xfrm flipH="1">
-            <a:off x="4725602" y="862835"/>
-            <a:ext cx="1" cy="311623"/>
+            <a:off x="4798524" y="1560847"/>
+            <a:ext cx="1" cy="278243"/>
           </a:xfrm>
           <a:prstGeom prst="straightConnector1">
             <a:avLst/>
@@ -7645,8 +7621,8 @@
         </p:nvCxnSpPr>
         <p:spPr>
           <a:xfrm flipH="1" flipV="1">
-            <a:off x="4725602" y="1542700"/>
-            <a:ext cx="4962" cy="311940"/>
+            <a:off x="4798524" y="2207332"/>
+            <a:ext cx="4962" cy="278243"/>
           </a:xfrm>
           <a:prstGeom prst="straightConnector1">
             <a:avLst/>
@@ -7686,7 +7662,7 @@
         </p:nvSpPr>
         <p:spPr>
           <a:xfrm>
-            <a:off x="4824823" y="866681"/>
+            <a:off x="4897745" y="1542952"/>
             <a:ext cx="810851" cy="307777"/>
           </a:xfrm>
           <a:prstGeom prst="rect">
@@ -7730,7 +7706,7 @@
         </p:nvSpPr>
         <p:spPr>
           <a:xfrm>
-            <a:off x="4825031" y="1539898"/>
+            <a:off x="4897953" y="2189274"/>
             <a:ext cx="810851" cy="307777"/>
           </a:xfrm>
           <a:prstGeom prst="rect">
@@ -7774,7 +7750,7 @@
         </p:nvSpPr>
         <p:spPr>
           <a:xfrm>
-            <a:off x="4824823" y="2222882"/>
+            <a:off x="4897745" y="2836398"/>
             <a:ext cx="810851" cy="307777"/>
           </a:xfrm>
           <a:prstGeom prst="rect">
@@ -7818,7 +7794,7 @@
         </p:nvSpPr>
         <p:spPr>
           <a:xfrm>
-            <a:off x="4835161" y="2883736"/>
+            <a:off x="6712069" y="3467693"/>
             <a:ext cx="810851" cy="307777"/>
           </a:xfrm>
           <a:prstGeom prst="rect">
@@ -7865,8 +7841,8 @@
         </p:nvCxnSpPr>
         <p:spPr>
           <a:xfrm flipH="1">
-            <a:off x="1785648" y="678714"/>
-            <a:ext cx="1246286" cy="2730779"/>
+            <a:off x="1574558" y="1376726"/>
+            <a:ext cx="1530298" cy="1346695"/>
           </a:xfrm>
           <a:prstGeom prst="straightConnector1">
             <a:avLst/>
@@ -7909,8 +7885,8 @@
         </p:nvCxnSpPr>
         <p:spPr>
           <a:xfrm flipH="1">
-            <a:off x="1785648" y="1358579"/>
-            <a:ext cx="1246285" cy="2050914"/>
+            <a:off x="1574558" y="2023211"/>
+            <a:ext cx="1530297" cy="700210"/>
           </a:xfrm>
           <a:prstGeom prst="straightConnector1">
             <a:avLst/>
@@ -7953,8 +7929,8 @@
         </p:nvCxnSpPr>
         <p:spPr>
           <a:xfrm flipH="1">
-            <a:off x="1785648" y="2038761"/>
-            <a:ext cx="1256208" cy="1370732"/>
+            <a:off x="1574558" y="2669696"/>
+            <a:ext cx="1540220" cy="53725"/>
           </a:xfrm>
           <a:prstGeom prst="straightConnector1">
             <a:avLst/>
@@ -7996,9 +7972,9 @@
           <p:nvPr/>
         </p:nvCxnSpPr>
         <p:spPr>
-          <a:xfrm flipH="1">
-            <a:off x="1785648" y="2736297"/>
-            <a:ext cx="1259777" cy="673196"/>
+          <a:xfrm flipH="1" flipV="1">
+            <a:off x="1574558" y="2723421"/>
+            <a:ext cx="1543789" cy="1239245"/>
           </a:xfrm>
           <a:prstGeom prst="straightConnector1">
             <a:avLst/>
@@ -8040,9 +8016,9 @@
           <p:nvPr/>
         </p:nvCxnSpPr>
         <p:spPr>
-          <a:xfrm flipH="1">
-            <a:off x="1785648" y="3407363"/>
-            <a:ext cx="1256208" cy="2130"/>
+          <a:xfrm flipH="1" flipV="1">
+            <a:off x="1574558" y="2723421"/>
+            <a:ext cx="1540220" cy="1885730"/>
           </a:xfrm>
           <a:prstGeom prst="straightConnector1">
             <a:avLst/>
@@ -8085,8 +8061,8 @@
         </p:nvCxnSpPr>
         <p:spPr>
           <a:xfrm flipH="1" flipV="1">
-            <a:off x="1785648" y="3409493"/>
-            <a:ext cx="1266130" cy="642290"/>
+            <a:off x="1574558" y="2723421"/>
+            <a:ext cx="1550142" cy="2532215"/>
           </a:xfrm>
           <a:prstGeom prst="straightConnector1">
             <a:avLst/>
@@ -8129,8 +8105,8 @@
         </p:nvCxnSpPr>
         <p:spPr>
           <a:xfrm flipH="1" flipV="1">
-            <a:off x="1785648" y="3409493"/>
-            <a:ext cx="1279621" cy="1270906"/>
+            <a:off x="1574558" y="2723421"/>
+            <a:ext cx="1563633" cy="3178700"/>
           </a:xfrm>
           <a:prstGeom prst="straightConnector1">
             <a:avLst/>
@@ -8173,8 +8149,8 @@
         </p:nvCxnSpPr>
         <p:spPr>
           <a:xfrm flipH="1" flipV="1">
-            <a:off x="1785648" y="3409493"/>
-            <a:ext cx="1289543" cy="1881274"/>
+            <a:off x="1574558" y="2723421"/>
+            <a:ext cx="1573555" cy="3825185"/>
           </a:xfrm>
           <a:prstGeom prst="straightConnector1">
             <a:avLst/>
@@ -8217,8 +8193,8 @@
         </p:nvCxnSpPr>
         <p:spPr>
           <a:xfrm flipH="1" flipV="1">
-            <a:off x="1785648" y="3409493"/>
-            <a:ext cx="1299714" cy="2520968"/>
+            <a:off x="1574558" y="2723421"/>
+            <a:ext cx="1583726" cy="4471667"/>
           </a:xfrm>
           <a:prstGeom prst="straightConnector1">
             <a:avLst/>
@@ -8258,7 +8234,7 @@
         </p:nvSpPr>
         <p:spPr>
           <a:xfrm>
-            <a:off x="2181394" y="3109821"/>
+            <a:off x="2273194" y="2374446"/>
             <a:ext cx="671378" cy="307777"/>
           </a:xfrm>
           <a:prstGeom prst="rect">
@@ -8302,8 +8278,8 @@
         </p:nvSpPr>
         <p:spPr>
           <a:xfrm>
-            <a:off x="6647465" y="494593"/>
-            <a:ext cx="367100" cy="2501597"/>
+            <a:off x="7351555" y="1269846"/>
+            <a:ext cx="367100" cy="2960224"/>
           </a:xfrm>
           <a:prstGeom prst="rightBrace">
             <a:avLst/>
@@ -8345,11 +8321,14 @@
         </p:nvSpPr>
         <p:spPr>
           <a:xfrm>
-            <a:off x="6677229" y="3211355"/>
-            <a:ext cx="367100" cy="2923069"/>
+            <a:off x="7351555" y="4350084"/>
+            <a:ext cx="396864" cy="3013572"/>
           </a:xfrm>
           <a:prstGeom prst="rightBrace">
-            <a:avLst/>
+            <a:avLst>
+              <a:gd name="adj1" fmla="val 0"/>
+              <a:gd name="adj2" fmla="val 50000"/>
+            </a:avLst>
           </a:prstGeom>
           <a:ln>
             <a:solidFill>
@@ -8388,7 +8367,7 @@
         </p:nvSpPr>
         <p:spPr>
           <a:xfrm>
-            <a:off x="6905423" y="1171368"/>
+            <a:off x="7609513" y="2123256"/>
             <a:ext cx="1595011" cy="1200329"/>
           </a:xfrm>
           <a:prstGeom prst="rect">
@@ -8494,7 +8473,7 @@
         </p:nvSpPr>
         <p:spPr>
           <a:xfrm>
-            <a:off x="6918913" y="4406989"/>
+            <a:off x="7711808" y="5538971"/>
             <a:ext cx="1492716" cy="646331"/>
           </a:xfrm>
           <a:prstGeom prst="rect">
@@ -8556,6 +8535,709 @@
           </a:p>
         </p:txBody>
       </p:sp>
+      <p:sp>
+        <p:nvSpPr>
+          <p:cNvPr id="34" name="角丸四角形 33"/>
+          <p:cNvSpPr/>
+          <p:nvPr/>
+        </p:nvSpPr>
+        <p:spPr>
+          <a:xfrm>
+            <a:off x="3094933" y="-100365"/>
+            <a:ext cx="3387338" cy="368242"/>
+          </a:xfrm>
+          <a:prstGeom prst="roundRect">
+            <a:avLst/>
+          </a:prstGeom>
+          <a:gradFill>
+            <a:gsLst>
+              <a:gs pos="0">
+                <a:schemeClr val="bg1">
+                  <a:lumMod val="75000"/>
+                </a:schemeClr>
+              </a:gs>
+              <a:gs pos="100000">
+                <a:schemeClr val="bg1">
+                  <a:lumMod val="95000"/>
+                </a:schemeClr>
+              </a:gs>
+            </a:gsLst>
+          </a:gradFill>
+        </p:spPr>
+        <p:style>
+          <a:lnRef idx="1">
+            <a:schemeClr val="dk1"/>
+          </a:lnRef>
+          <a:fillRef idx="3">
+            <a:schemeClr val="dk1"/>
+          </a:fillRef>
+          <a:effectRef idx="2">
+            <a:schemeClr val="dk1"/>
+          </a:effectRef>
+          <a:fontRef idx="minor">
+            <a:schemeClr val="lt1"/>
+          </a:fontRef>
+        </p:style>
+        <p:txBody>
+          <a:bodyPr rtlCol="0" anchor="ctr"/>
+          <a:lstStyle/>
+          <a:p>
+            <a:pPr algn="ctr"/>
+            <a:r>
+              <a:rPr lang="en-US" altLang="ja-JP" sz="1600" dirty="0" err="1" smtClean="0">
+                <a:solidFill>
+                  <a:schemeClr val="tx1">
+                    <a:lumMod val="75000"/>
+                    <a:lumOff val="25000"/>
+                  </a:schemeClr>
+                </a:solidFill>
+              </a:rPr>
+              <a:t>codepoints</a:t>
+            </a:r>
+            <a:endParaRPr kumimoji="1" lang="en-US" altLang="ja-JP" sz="1600" dirty="0" smtClean="0">
+              <a:solidFill>
+                <a:schemeClr val="tx1">
+                  <a:lumMod val="75000"/>
+                  <a:lumOff val="25000"/>
+                </a:schemeClr>
+              </a:solidFill>
+            </a:endParaRPr>
+          </a:p>
+        </p:txBody>
+      </p:sp>
+      <p:sp>
+        <p:nvSpPr>
+          <p:cNvPr id="35" name="角丸四角形 34"/>
+          <p:cNvSpPr/>
+          <p:nvPr/>
+        </p:nvSpPr>
+        <p:spPr>
+          <a:xfrm>
+            <a:off x="3094933" y="-746850"/>
+            <a:ext cx="3387338" cy="368242"/>
+          </a:xfrm>
+          <a:prstGeom prst="roundRect">
+            <a:avLst/>
+          </a:prstGeom>
+          <a:gradFill>
+            <a:gsLst>
+              <a:gs pos="0">
+                <a:schemeClr val="bg1">
+                  <a:lumMod val="75000"/>
+                </a:schemeClr>
+              </a:gs>
+              <a:gs pos="100000">
+                <a:schemeClr val="bg1">
+                  <a:lumMod val="95000"/>
+                </a:schemeClr>
+              </a:gs>
+            </a:gsLst>
+          </a:gradFill>
+        </p:spPr>
+        <p:style>
+          <a:lnRef idx="1">
+            <a:schemeClr val="dk1"/>
+          </a:lnRef>
+          <a:fillRef idx="3">
+            <a:schemeClr val="dk1"/>
+          </a:fillRef>
+          <a:effectRef idx="2">
+            <a:schemeClr val="dk1"/>
+          </a:effectRef>
+          <a:fontRef idx="minor">
+            <a:schemeClr val="lt1"/>
+          </a:fontRef>
+        </p:style>
+        <p:txBody>
+          <a:bodyPr rtlCol="0" anchor="ctr"/>
+          <a:lstStyle/>
+          <a:p>
+            <a:pPr algn="ctr"/>
+            <a:r>
+              <a:rPr kumimoji="1" lang="en-US" altLang="ja-JP" sz="1600" dirty="0" smtClean="0">
+                <a:solidFill>
+                  <a:schemeClr val="tx1">
+                    <a:lumMod val="75000"/>
+                    <a:lumOff val="25000"/>
+                  </a:schemeClr>
+                </a:solidFill>
+              </a:rPr>
+              <a:t>string</a:t>
+            </a:r>
+          </a:p>
+        </p:txBody>
+      </p:sp>
+      <p:sp>
+        <p:nvSpPr>
+          <p:cNvPr id="36" name="角丸四角形 35"/>
+          <p:cNvSpPr/>
+          <p:nvPr/>
+        </p:nvSpPr>
+        <p:spPr>
+          <a:xfrm>
+            <a:off x="3094933" y="546120"/>
+            <a:ext cx="3387338" cy="368242"/>
+          </a:xfrm>
+          <a:prstGeom prst="roundRect">
+            <a:avLst/>
+          </a:prstGeom>
+          <a:gradFill>
+            <a:gsLst>
+              <a:gs pos="0">
+                <a:schemeClr val="bg1">
+                  <a:lumMod val="75000"/>
+                </a:schemeClr>
+              </a:gs>
+              <a:gs pos="100000">
+                <a:schemeClr val="bg1">
+                  <a:lumMod val="95000"/>
+                </a:schemeClr>
+              </a:gs>
+            </a:gsLst>
+          </a:gradFill>
+        </p:spPr>
+        <p:style>
+          <a:lnRef idx="1">
+            <a:schemeClr val="dk1"/>
+          </a:lnRef>
+          <a:fillRef idx="3">
+            <a:schemeClr val="dk1"/>
+          </a:fillRef>
+          <a:effectRef idx="2">
+            <a:schemeClr val="dk1"/>
+          </a:effectRef>
+          <a:fontRef idx="minor">
+            <a:schemeClr val="lt1"/>
+          </a:fontRef>
+        </p:style>
+        <p:txBody>
+          <a:bodyPr rtlCol="0" anchor="ctr"/>
+          <a:lstStyle/>
+          <a:p>
+            <a:pPr algn="ctr"/>
+            <a:r>
+              <a:rPr lang="en-US" altLang="ja-JP" sz="1600" dirty="0" smtClean="0">
+                <a:solidFill>
+                  <a:schemeClr val="tx1">
+                    <a:lumMod val="75000"/>
+                    <a:lumOff val="25000"/>
+                  </a:schemeClr>
+                </a:solidFill>
+              </a:rPr>
+              <a:t>validator</a:t>
+            </a:r>
+            <a:endParaRPr kumimoji="1" lang="en-US" altLang="ja-JP" sz="1600" dirty="0" smtClean="0">
+              <a:solidFill>
+                <a:schemeClr val="tx1">
+                  <a:lumMod val="75000"/>
+                  <a:lumOff val="25000"/>
+                </a:schemeClr>
+              </a:solidFill>
+            </a:endParaRPr>
+          </a:p>
+        </p:txBody>
+      </p:sp>
+      <p:cxnSp>
+        <p:nvCxnSpPr>
+          <p:cNvPr id="58" name="直線コネクタ 2"/>
+          <p:cNvCxnSpPr>
+            <a:stCxn id="36" idx="1"/>
+            <a:endCxn id="56" idx="3"/>
+          </p:cNvCxnSpPr>
+          <p:nvPr/>
+        </p:nvCxnSpPr>
+        <p:spPr>
+          <a:xfrm flipH="1">
+            <a:off x="1574558" y="730241"/>
+            <a:ext cx="1520375" cy="1993180"/>
+          </a:xfrm>
+          <a:prstGeom prst="straightConnector1">
+            <a:avLst/>
+          </a:prstGeom>
+          <a:ln w="12700" cmpd="sng">
+            <a:solidFill>
+              <a:schemeClr val="tx1">
+                <a:lumMod val="50000"/>
+                <a:lumOff val="50000"/>
+              </a:schemeClr>
+            </a:solidFill>
+            <a:prstDash val="solid"/>
+            <a:headEnd type="none"/>
+            <a:tailEnd type="none"/>
+          </a:ln>
+        </p:spPr>
+        <p:style>
+          <a:lnRef idx="2">
+            <a:schemeClr val="accent1"/>
+          </a:lnRef>
+          <a:fillRef idx="0">
+            <a:schemeClr val="accent1"/>
+          </a:fillRef>
+          <a:effectRef idx="1">
+            <a:schemeClr val="accent1"/>
+          </a:effectRef>
+          <a:fontRef idx="minor">
+            <a:schemeClr val="tx1"/>
+          </a:fontRef>
+        </p:style>
+      </p:cxnSp>
+      <p:cxnSp>
+        <p:nvCxnSpPr>
+          <p:cNvPr id="59" name="直線コネクタ 2"/>
+          <p:cNvCxnSpPr>
+            <a:stCxn id="34" idx="1"/>
+            <a:endCxn id="56" idx="3"/>
+          </p:cNvCxnSpPr>
+          <p:nvPr/>
+        </p:nvCxnSpPr>
+        <p:spPr>
+          <a:xfrm flipH="1">
+            <a:off x="1574558" y="83756"/>
+            <a:ext cx="1520375" cy="2639665"/>
+          </a:xfrm>
+          <a:prstGeom prst="straightConnector1">
+            <a:avLst/>
+          </a:prstGeom>
+          <a:ln w="12700" cmpd="sng">
+            <a:solidFill>
+              <a:schemeClr val="tx1">
+                <a:lumMod val="50000"/>
+                <a:lumOff val="50000"/>
+              </a:schemeClr>
+            </a:solidFill>
+            <a:prstDash val="solid"/>
+            <a:headEnd type="none"/>
+            <a:tailEnd type="none"/>
+          </a:ln>
+        </p:spPr>
+        <p:style>
+          <a:lnRef idx="2">
+            <a:schemeClr val="accent1"/>
+          </a:lnRef>
+          <a:fillRef idx="0">
+            <a:schemeClr val="accent1"/>
+          </a:fillRef>
+          <a:effectRef idx="1">
+            <a:schemeClr val="accent1"/>
+          </a:effectRef>
+          <a:fontRef idx="minor">
+            <a:schemeClr val="tx1"/>
+          </a:fontRef>
+        </p:style>
+      </p:cxnSp>
+      <p:cxnSp>
+        <p:nvCxnSpPr>
+          <p:cNvPr id="61" name="直線コネクタ 2"/>
+          <p:cNvCxnSpPr>
+            <a:stCxn id="35" idx="1"/>
+            <a:endCxn id="56" idx="3"/>
+          </p:cNvCxnSpPr>
+          <p:nvPr/>
+        </p:nvCxnSpPr>
+        <p:spPr>
+          <a:xfrm flipH="1">
+            <a:off x="1574558" y="-562729"/>
+            <a:ext cx="1520375" cy="3286150"/>
+          </a:xfrm>
+          <a:prstGeom prst="straightConnector1">
+            <a:avLst/>
+          </a:prstGeom>
+          <a:ln w="12700" cmpd="sng">
+            <a:solidFill>
+              <a:schemeClr val="tx1">
+                <a:lumMod val="50000"/>
+                <a:lumOff val="50000"/>
+              </a:schemeClr>
+            </a:solidFill>
+            <a:prstDash val="solid"/>
+            <a:headEnd type="none"/>
+            <a:tailEnd type="none"/>
+          </a:ln>
+        </p:spPr>
+        <p:style>
+          <a:lnRef idx="2">
+            <a:schemeClr val="accent1"/>
+          </a:lnRef>
+          <a:fillRef idx="0">
+            <a:schemeClr val="accent1"/>
+          </a:fillRef>
+          <a:effectRef idx="1">
+            <a:schemeClr val="accent1"/>
+          </a:effectRef>
+          <a:fontRef idx="minor">
+            <a:schemeClr val="tx1"/>
+          </a:fontRef>
+        </p:style>
+      </p:cxnSp>
+      <p:sp>
+        <p:nvSpPr>
+          <p:cNvPr id="64" name="右中かっこ 63"/>
+          <p:cNvSpPr/>
+          <p:nvPr/>
+        </p:nvSpPr>
+        <p:spPr>
+          <a:xfrm>
+            <a:off x="7351555" y="-920809"/>
+            <a:ext cx="367100" cy="2016000"/>
+          </a:xfrm>
+          <a:prstGeom prst="rightBrace">
+            <a:avLst/>
+          </a:prstGeom>
+          <a:ln>
+            <a:solidFill>
+              <a:srgbClr val="7F7F7F"/>
+            </a:solidFill>
+          </a:ln>
+        </p:spPr>
+        <p:style>
+          <a:lnRef idx="2">
+            <a:schemeClr val="accent1"/>
+          </a:lnRef>
+          <a:fillRef idx="0">
+            <a:schemeClr val="accent1"/>
+          </a:fillRef>
+          <a:effectRef idx="1">
+            <a:schemeClr val="accent1"/>
+          </a:effectRef>
+          <a:fontRef idx="minor">
+            <a:schemeClr val="tx1"/>
+          </a:fontRef>
+        </p:style>
+        <p:txBody>
+          <a:bodyPr rtlCol="0" anchor="ctr"/>
+          <a:lstStyle/>
+          <a:p>
+            <a:pPr algn="ctr"/>
+            <a:endParaRPr kumimoji="1" lang="ja-JP" altLang="en-US"/>
+          </a:p>
+        </p:txBody>
+      </p:sp>
+      <p:sp>
+        <p:nvSpPr>
+          <p:cNvPr id="66" name="テキスト ボックス 65"/>
+          <p:cNvSpPr txBox="1"/>
+          <p:nvPr/>
+        </p:nvSpPr>
+        <p:spPr>
+          <a:xfrm>
+            <a:off x="7718655" y="-378608"/>
+            <a:ext cx="2152047" cy="923330"/>
+          </a:xfrm>
+          <a:prstGeom prst="rect">
+            <a:avLst/>
+          </a:prstGeom>
+          <a:noFill/>
+        </p:spPr>
+        <p:txBody>
+          <a:bodyPr wrap="square" rtlCol="0">
+            <a:spAutoFit/>
+          </a:bodyPr>
+          <a:lstStyle/>
+          <a:p>
+            <a:pPr algn="ctr"/>
+            <a:r>
+              <a:rPr lang="en-US" altLang="ja-JP" dirty="0" smtClean="0">
+                <a:solidFill>
+                  <a:schemeClr val="tx1">
+                    <a:lumMod val="65000"/>
+                    <a:lumOff val="35000"/>
+                  </a:schemeClr>
+                </a:solidFill>
+              </a:rPr>
+              <a:t>Provide</a:t>
+            </a:r>
+            <a:endParaRPr kumimoji="1" lang="en-US" altLang="ja-JP" dirty="0" smtClean="0">
+              <a:solidFill>
+                <a:schemeClr val="tx1">
+                  <a:lumMod val="65000"/>
+                  <a:lumOff val="35000"/>
+                </a:schemeClr>
+              </a:solidFill>
+            </a:endParaRPr>
+          </a:p>
+          <a:p>
+            <a:pPr algn="ctr"/>
+            <a:r>
+              <a:rPr lang="en-US" altLang="ja-JP" dirty="0" smtClean="0">
+                <a:solidFill>
+                  <a:schemeClr val="tx1">
+                    <a:lumMod val="65000"/>
+                    <a:lumOff val="35000"/>
+                  </a:schemeClr>
+                </a:solidFill>
+              </a:rPr>
+              <a:t>C</a:t>
+            </a:r>
+            <a:r>
+              <a:rPr kumimoji="1" lang="en-US" altLang="ja-JP" dirty="0" smtClean="0">
+                <a:solidFill>
+                  <a:schemeClr val="tx1">
+                    <a:lumMod val="65000"/>
+                    <a:lumOff val="35000"/>
+                  </a:schemeClr>
+                </a:solidFill>
+              </a:rPr>
+              <a:t>lasses</a:t>
+            </a:r>
+            <a:endParaRPr lang="en-US" altLang="ja-JP" dirty="0">
+              <a:solidFill>
+                <a:schemeClr val="tx1">
+                  <a:lumMod val="65000"/>
+                  <a:lumOff val="35000"/>
+                </a:schemeClr>
+              </a:solidFill>
+            </a:endParaRPr>
+          </a:p>
+          <a:p>
+            <a:pPr algn="ctr"/>
+            <a:r>
+              <a:rPr lang="en-US" altLang="ja-JP" dirty="0" smtClean="0">
+                <a:solidFill>
+                  <a:schemeClr val="tx1">
+                    <a:lumMod val="65000"/>
+                    <a:lumOff val="35000"/>
+                  </a:schemeClr>
+                </a:solidFill>
+              </a:rPr>
+              <a:t>(Standalone library)</a:t>
+            </a:r>
+            <a:endParaRPr kumimoji="1" lang="ja-JP" altLang="en-US" dirty="0">
+              <a:solidFill>
+                <a:schemeClr val="tx1">
+                  <a:lumMod val="65000"/>
+                  <a:lumOff val="35000"/>
+                </a:schemeClr>
+              </a:solidFill>
+            </a:endParaRPr>
+          </a:p>
+        </p:txBody>
+      </p:sp>
+      <p:sp>
+        <p:nvSpPr>
+          <p:cNvPr id="60" name="角丸四角形 59"/>
+          <p:cNvSpPr/>
+          <p:nvPr/>
+        </p:nvSpPr>
+        <p:spPr>
+          <a:xfrm>
+            <a:off x="3114778" y="3132060"/>
+            <a:ext cx="3377415" cy="368242"/>
+          </a:xfrm>
+          <a:prstGeom prst="roundRect">
+            <a:avLst/>
+          </a:prstGeom>
+          <a:gradFill>
+            <a:gsLst>
+              <a:gs pos="0">
+                <a:schemeClr val="bg1">
+                  <a:lumMod val="75000"/>
+                </a:schemeClr>
+              </a:gs>
+              <a:gs pos="100000">
+                <a:schemeClr val="bg1">
+                  <a:lumMod val="95000"/>
+                </a:schemeClr>
+              </a:gs>
+            </a:gsLst>
+          </a:gradFill>
+        </p:spPr>
+        <p:style>
+          <a:lnRef idx="1">
+            <a:schemeClr val="dk1"/>
+          </a:lnRef>
+          <a:fillRef idx="3">
+            <a:schemeClr val="dk1"/>
+          </a:fillRef>
+          <a:effectRef idx="2">
+            <a:schemeClr val="dk1"/>
+          </a:effectRef>
+          <a:fontRef idx="minor">
+            <a:schemeClr val="lt1"/>
+          </a:fontRef>
+        </p:style>
+        <p:txBody>
+          <a:bodyPr rtlCol="0" anchor="ctr"/>
+          <a:lstStyle/>
+          <a:p>
+            <a:pPr algn="ctr"/>
+            <a:r>
+              <a:rPr kumimoji="1" lang="en-US" altLang="ja-JP" sz="1600" dirty="0" smtClean="0">
+                <a:solidFill>
+                  <a:schemeClr val="tx1">
+                    <a:lumMod val="75000"/>
+                    <a:lumOff val="25000"/>
+                  </a:schemeClr>
+                </a:solidFill>
+              </a:rPr>
+              <a:t>web</a:t>
+            </a:r>
+            <a:r>
+              <a:rPr lang="en-US" altLang="ja-JP" sz="1600" dirty="0" smtClean="0">
+                <a:solidFill>
+                  <a:schemeClr val="tx1">
+                    <a:lumMod val="75000"/>
+                    <a:lumOff val="25000"/>
+                  </a:schemeClr>
+                </a:solidFill>
+              </a:rPr>
+              <a:t>-</a:t>
+            </a:r>
+            <a:r>
+              <a:rPr lang="en-US" altLang="ja-JP" sz="1600" dirty="0" err="1" smtClean="0">
+                <a:solidFill>
+                  <a:schemeClr val="tx1">
+                    <a:lumMod val="75000"/>
+                    <a:lumOff val="25000"/>
+                  </a:schemeClr>
+                </a:solidFill>
+              </a:rPr>
+              <a:t>jsp</a:t>
+            </a:r>
+            <a:endParaRPr kumimoji="1" lang="en-US" altLang="ja-JP" sz="1600" dirty="0" smtClean="0">
+              <a:solidFill>
+                <a:schemeClr val="tx1">
+                  <a:lumMod val="75000"/>
+                  <a:lumOff val="25000"/>
+                </a:schemeClr>
+              </a:solidFill>
+            </a:endParaRPr>
+          </a:p>
+        </p:txBody>
+      </p:sp>
+      <p:sp>
+        <p:nvSpPr>
+          <p:cNvPr id="69" name="テキスト ボックス 68"/>
+          <p:cNvSpPr txBox="1"/>
+          <p:nvPr/>
+        </p:nvSpPr>
+        <p:spPr>
+          <a:xfrm>
+            <a:off x="4906044" y="4130687"/>
+            <a:ext cx="810851" cy="307777"/>
+          </a:xfrm>
+          <a:prstGeom prst="rect">
+            <a:avLst/>
+          </a:prstGeom>
+          <a:noFill/>
+        </p:spPr>
+        <p:txBody>
+          <a:bodyPr wrap="none" rtlCol="0">
+            <a:spAutoFit/>
+          </a:bodyPr>
+          <a:lstStyle/>
+          <a:p>
+            <a:r>
+              <a:rPr kumimoji="1" lang="en-US" altLang="ja-JP" sz="1400" dirty="0" smtClean="0">
+                <a:solidFill>
+                  <a:schemeClr val="tx1">
+                    <a:lumMod val="50000"/>
+                    <a:lumOff val="50000"/>
+                  </a:schemeClr>
+                </a:solidFill>
+              </a:rPr>
+              <a:t>depends</a:t>
+            </a:r>
+            <a:endParaRPr kumimoji="1" lang="ja-JP" altLang="en-US" sz="1400" dirty="0">
+              <a:solidFill>
+                <a:schemeClr val="tx1">
+                  <a:lumMod val="50000"/>
+                  <a:lumOff val="50000"/>
+                </a:schemeClr>
+              </a:solidFill>
+            </a:endParaRPr>
+          </a:p>
+        </p:txBody>
+      </p:sp>
+      <p:cxnSp>
+        <p:nvCxnSpPr>
+          <p:cNvPr id="21" name="カギ線コネクタ 20"/>
+          <p:cNvCxnSpPr>
+            <a:stCxn id="47" idx="3"/>
+            <a:endCxn id="53" idx="3"/>
+          </p:cNvCxnSpPr>
+          <p:nvPr/>
+        </p:nvCxnSpPr>
+        <p:spPr>
+          <a:xfrm flipV="1">
+            <a:off x="6482271" y="2669696"/>
+            <a:ext cx="9922" cy="1292970"/>
+          </a:xfrm>
+          <a:prstGeom prst="bentConnector3">
+            <a:avLst>
+              <a:gd name="adj1" fmla="val 2403971"/>
+            </a:avLst>
+          </a:prstGeom>
+          <a:ln w="12700" cmpd="sng">
+            <a:solidFill>
+              <a:schemeClr val="tx1">
+                <a:lumMod val="50000"/>
+                <a:lumOff val="50000"/>
+              </a:schemeClr>
+            </a:solidFill>
+            <a:prstDash val="sysDash"/>
+            <a:headEnd type="none"/>
+            <a:tailEnd type="triangle"/>
+          </a:ln>
+        </p:spPr>
+        <p:style>
+          <a:lnRef idx="2">
+            <a:schemeClr val="accent1"/>
+          </a:lnRef>
+          <a:fillRef idx="0">
+            <a:schemeClr val="accent1"/>
+          </a:fillRef>
+          <a:effectRef idx="1">
+            <a:schemeClr val="accent1"/>
+          </a:effectRef>
+          <a:fontRef idx="minor">
+            <a:schemeClr val="tx1"/>
+          </a:fontRef>
+        </p:style>
+      </p:cxnSp>
+      <p:cxnSp>
+        <p:nvCxnSpPr>
+          <p:cNvPr id="45" name="直線コネクタ 2"/>
+          <p:cNvCxnSpPr>
+            <a:stCxn id="60" idx="1"/>
+            <a:endCxn id="56" idx="3"/>
+          </p:cNvCxnSpPr>
+          <p:nvPr/>
+        </p:nvCxnSpPr>
+        <p:spPr>
+          <a:xfrm flipH="1" flipV="1">
+            <a:off x="1574558" y="2723421"/>
+            <a:ext cx="1540220" cy="592760"/>
+          </a:xfrm>
+          <a:prstGeom prst="straightConnector1">
+            <a:avLst/>
+          </a:prstGeom>
+          <a:ln w="12700" cmpd="sng">
+            <a:solidFill>
+              <a:schemeClr val="tx1">
+                <a:lumMod val="50000"/>
+                <a:lumOff val="50000"/>
+              </a:schemeClr>
+            </a:solidFill>
+            <a:prstDash val="solid"/>
+            <a:headEnd type="none"/>
+            <a:tailEnd type="none"/>
+          </a:ln>
+        </p:spPr>
+        <p:style>
+          <a:lnRef idx="2">
+            <a:schemeClr val="accent1"/>
+          </a:lnRef>
+          <a:fillRef idx="0">
+            <a:schemeClr val="accent1"/>
+          </a:fillRef>
+          <a:effectRef idx="1">
+            <a:schemeClr val="accent1"/>
+          </a:effectRef>
+          <a:fontRef idx="minor">
+            <a:schemeClr val="tx1"/>
+          </a:fontRef>
+        </p:style>
+      </p:cxnSp>
     </p:spTree>
     <p:extLst>
       <p:ext uri="{BB962C8B-B14F-4D97-AF65-F5344CB8AC3E}">
@@ -8569,7 +9251,7 @@
   <p:timing>
     <p:tnLst>
       <p:par>
-        <p:cTn xmlns:p14="http://schemas.microsoft.com/office/powerpoint/2010/main" id="1" dur="indefinite" restart="never" nodeType="tmRoot"/>
+        <p:cTn id="1" dur="indefinite" restart="never" nodeType="tmRoot"/>
       </p:par>
     </p:tnLst>
   </p:timing>
@@ -8892,7 +9574,19 @@
       </a:style>
     </a:spDef>
     <a:lnDef>
-      <a:spPr/>
+      <a:spPr>
+        <a:ln w="12700" cmpd="sng">
+          <a:solidFill>
+            <a:schemeClr val="tx1">
+              <a:lumMod val="50000"/>
+              <a:lumOff val="50000"/>
+            </a:schemeClr>
+          </a:solidFill>
+          <a:prstDash val="sysDash"/>
+          <a:headEnd type="none"/>
+          <a:tailEnd type="arrow"/>
+        </a:ln>
+      </a:spPr>
       <a:bodyPr/>
       <a:lstStyle/>
       <a:style>

</xml_diff>